<commit_message>
Fifth Commit:updated Visualization project
</commit_message>
<xml_diff>
--- a/group A194.pptx
+++ b/group A194.pptx
@@ -150,14 +150,6 @@
 </p:presentation>
 </file>
 
-<file path=ppt/revisionInfo.xml><?xml version="1.0" encoding="utf-8"?>
-<p1510:revInfo xmlns:a="http://schemas.openxmlformats.org/drawingml/2006/main" xmlns:r="http://schemas.openxmlformats.org/officeDocument/2006/relationships" xmlns:p1510="http://schemas.microsoft.com/office/powerpoint/2015/10/main">
-  <p1510:revLst>
-    <p1510:client id="{F7471A1C-E7E4-4F26-82C7-E9B21351B1F7}" v="4" dt="2024-11-15T21:21:31.506"/>
-  </p1510:revLst>
-</p1510:revInfo>
-</file>
-
 <file path=ppt/changesInfos/changesInfo1.xml><?xml version="1.0" encoding="utf-8"?>
 <pc:chgInfo xmlns:a="http://schemas.openxmlformats.org/drawingml/2006/main" xmlns:r="http://schemas.openxmlformats.org/officeDocument/2006/relationships" xmlns:ac="http://schemas.microsoft.com/office/drawing/2013/main/command" xmlns:pc="http://schemas.microsoft.com/office/powerpoint/2013/main/command">
   <pc:docChgLst>
@@ -200,6 +192,30 @@
       </pc:sldChg>
     </pc:docChg>
   </pc:docChgLst>
+  <pc:docChgLst>
+    <pc:chgData name="Ranan Barua [Student-PECS]" userId="a2a17731-56e9-49ff-a9b1-e46b63e7787c" providerId="ADAL" clId="{792D9F46-2757-4F99-9674-09DA8544DA52}"/>
+    <pc:docChg chg="modSld">
+      <pc:chgData name="Ranan Barua [Student-PECS]" userId="a2a17731-56e9-49ff-a9b1-e46b63e7787c" providerId="ADAL" clId="{792D9F46-2757-4F99-9674-09DA8544DA52}" dt="2024-11-20T22:13:19.137" v="0" actId="20577"/>
+      <pc:docMkLst>
+        <pc:docMk/>
+      </pc:docMkLst>
+      <pc:sldChg chg="modSp mod">
+        <pc:chgData name="Ranan Barua [Student-PECS]" userId="a2a17731-56e9-49ff-a9b1-e46b63e7787c" providerId="ADAL" clId="{792D9F46-2757-4F99-9674-09DA8544DA52}" dt="2024-11-20T22:13:19.137" v="0" actId="20577"/>
+        <pc:sldMkLst>
+          <pc:docMk/>
+          <pc:sldMk cId="32494612" sldId="336"/>
+        </pc:sldMkLst>
+        <pc:spChg chg="mod">
+          <ac:chgData name="Ranan Barua [Student-PECS]" userId="a2a17731-56e9-49ff-a9b1-e46b63e7787c" providerId="ADAL" clId="{792D9F46-2757-4F99-9674-09DA8544DA52}" dt="2024-11-20T22:13:19.137" v="0" actId="20577"/>
+          <ac:spMkLst>
+            <pc:docMk/>
+            <pc:sldMk cId="32494612" sldId="336"/>
+            <ac:spMk id="5" creationId="{3440DA25-F620-152B-DE9E-776F7B74DFF0}"/>
+          </ac:spMkLst>
+        </pc:spChg>
+      </pc:sldChg>
+    </pc:docChg>
+  </pc:docChgLst>
 </pc:chgInfo>
 </file>
 
@@ -298,7 +314,7 @@
             <a:fld id="{93FAAC3A-BD1F-4A00-9099-74B95789FE00}" type="datetimeFigureOut">
               <a:rPr lang="en-GB" smtClean="0"/>
               <a:pPr/>
-              <a:t>15/11/2024</a:t>
+              <a:t>20/11/2024</a:t>
             </a:fld>
             <a:endParaRPr lang="en-GB"/>
           </a:p>
@@ -477,7 +493,7 @@
             <a:fld id="{8E359C8A-39F6-4045-9163-4042C4C26B15}" type="datetimeFigureOut">
               <a:rPr lang="en-GB" smtClean="0"/>
               <a:pPr/>
-              <a:t>15/11/2024</a:t>
+              <a:t>20/11/2024</a:t>
             </a:fld>
             <a:endParaRPr lang="en-GB"/>
           </a:p>
@@ -5471,7 +5487,7 @@
                 <a:ea typeface="Calibri" panose="020F0502020204030204" pitchFamily="34" charset="0"/>
                 <a:cs typeface="Times New Roman" panose="02020603050405020304" pitchFamily="18" charset="0"/>
               </a:rPr>
-              <a:t>Is there a difference in the mean quality rating between wines with low alcohol content and wine with hig</a:t>
+              <a:t>Is there a difference in the mean quality rating between wines with low alcohol content and wines with hig</a:t>
             </a:r>
             <a:r>
               <a:rPr lang="en-IE" sz="2400" b="0" dirty="0">
@@ -5609,16 +5625,10 @@
               <a:rPr lang="en-GB" sz="2400" b="0" spc="0" dirty="0">
                 <a:latin typeface="Raleway" pitchFamily="2" charset="0"/>
               </a:rPr>
-              <a:t>) :There is a difference in the mean quality rating between wines with low alcohol content and wines with </a:t>
-            </a:r>
-            <a:r>
-              <a:rPr lang="en-GB" sz="2400" b="0" spc="0">
-                <a:latin typeface="Raleway" pitchFamily="2" charset="0"/>
-              </a:rPr>
-              <a:t>high alcohol content</a:t>
-            </a:r>
-            <a:r>
-              <a:rPr lang="en-GB" sz="2400" b="0" spc="0">
+              <a:t>) :There is a difference in the mean quality rating between wines with low alcohol content and wines with high alcohol content</a:t>
+            </a:r>
+            <a:r>
+              <a:rPr lang="en-GB" sz="2400" b="0" spc="0" dirty="0">
                 <a:solidFill>
                   <a:schemeClr val="accent5">
                     <a:lumMod val="75000"/>
@@ -6687,6 +6697,15 @@
 </file>
 
 <file path=customXml/item1.xml><?xml version="1.0" encoding="utf-8"?>
+<?mso-contentType ?>
+<FormTemplates xmlns="http://schemas.microsoft.com/sharepoint/v3/contenttype/forms">
+  <Display>DocumentLibraryForm</Display>
+  <Edit>DocumentLibraryForm</Edit>
+  <New>DocumentLibraryForm</New>
+</FormTemplates>
+</file>
+
+<file path=customXml/item2.xml><?xml version="1.0" encoding="utf-8"?>
 <ct:contentTypeSchema xmlns:ct="http://schemas.microsoft.com/office/2006/metadata/contentType" xmlns:ma="http://schemas.microsoft.com/office/2006/metadata/properties/metaAttributes" ct:_="" ma:_="" ma:contentTypeName="Document" ma:contentTypeID="0x01010026DBA85F447B164191BB36C258697B67" ma:contentTypeVersion="14" ma:contentTypeDescription="Create a new document." ma:contentTypeScope="" ma:versionID="ea511d05ca7f895fe9556935b5c9af34">
   <xsd:schema xmlns:xsd="http://www.w3.org/2001/XMLSchema" xmlns:xs="http://www.w3.org/2001/XMLSchema" xmlns:p="http://schemas.microsoft.com/office/2006/metadata/properties" xmlns:ns2="4ad138b4-2b68-4b70-945d-07f8f18b1c9a" xmlns:ns3="3c474641-ec36-472f-b125-6b1b0910eaa4" targetNamespace="http://schemas.microsoft.com/office/2006/metadata/properties" ma:root="true" ma:fieldsID="662270106d7a7e100bcac2c5f8d29899" ns2:_="" ns3:_="">
     <xsd:import namespace="4ad138b4-2b68-4b70-945d-07f8f18b1c9a"/>
@@ -6911,15 +6930,6 @@
 </ct:contentTypeSchema>
 </file>
 
-<file path=customXml/item2.xml><?xml version="1.0" encoding="utf-8"?>
-<?mso-contentType ?>
-<FormTemplates xmlns="http://schemas.microsoft.com/sharepoint/v3/contenttype/forms">
-  <Display>DocumentLibraryForm</Display>
-  <Edit>DocumentLibraryForm</Edit>
-  <New>DocumentLibraryForm</New>
-</FormTemplates>
-</file>
-
 <file path=customXml/item3.xml><?xml version="1.0" encoding="utf-8"?>
 <p:properties xmlns:p="http://schemas.microsoft.com/office/2006/metadata/properties" xmlns:xsi="http://www.w3.org/2001/XMLSchema-instance" xmlns:pc="http://schemas.microsoft.com/office/infopath/2007/PartnerControls">
   <documentManagement>
@@ -6929,6 +6939,14 @@
 </file>
 
 <file path=customXml/itemProps1.xml><?xml version="1.0" encoding="utf-8"?>
+<ds:datastoreItem xmlns:ds="http://schemas.openxmlformats.org/officeDocument/2006/customXml" ds:itemID="{91C521DD-2673-4EE6-BB9B-DC5C3320FFBB}">
+  <ds:schemaRefs>
+    <ds:schemaRef ds:uri="http://schemas.microsoft.com/sharepoint/v3/contenttype/forms"/>
+  </ds:schemaRefs>
+</ds:datastoreItem>
+</file>
+
+<file path=customXml/itemProps2.xml><?xml version="1.0" encoding="utf-8"?>
 <ds:datastoreItem xmlns:ds="http://schemas.openxmlformats.org/officeDocument/2006/customXml" ds:itemID="{421B8C57-903D-4D0E-8336-7B512F760CD1}">
   <ds:schemaRefs>
     <ds:schemaRef ds:uri="http://schemas.microsoft.com/office/2006/metadata/contentType"/>
@@ -6943,14 +6961,6 @@
     <ds:schemaRef ds:uri="http://purl.org/dc/elements/1.1/"/>
     <ds:schemaRef ds:uri="http://purl.org/dc/terms/"/>
     <ds:schemaRef ds:uri="http://schemas.microsoft.com/internal/obd"/>
-  </ds:schemaRefs>
-</ds:datastoreItem>
-</file>
-
-<file path=customXml/itemProps2.xml><?xml version="1.0" encoding="utf-8"?>
-<ds:datastoreItem xmlns:ds="http://schemas.openxmlformats.org/officeDocument/2006/customXml" ds:itemID="{91C521DD-2673-4EE6-BB9B-DC5C3320FFBB}">
-  <ds:schemaRefs>
-    <ds:schemaRef ds:uri="http://schemas.microsoft.com/sharepoint/v3/contenttype/forms"/>
   </ds:schemaRefs>
 </ds:datastoreItem>
 </file>

</xml_diff>